<commit_message>
Add files for first class, and reset for 2026.
</commit_message>
<xml_diff>
--- a/bishops/cs321/resources/CS321_Lecture_01.pptx
+++ b/bishops/cs321/resources/CS321_Lecture_01.pptx
@@ -33404,7 +33404,7 @@
     <a:masterClrMapping/>
   </p:clrMapOvr>
   <mc:AlternateContent xmlns:mc="http://schemas.openxmlformats.org/markup-compatibility/2006">
-    <mc:Choice xmlns:p15="http://schemas.microsoft.com/office/powerpoint/2012/main" xmlns:p14="http://schemas.microsoft.com/office/powerpoint/2010/main" xmlns="" Requires="p14">
+    <mc:Choice xmlns="" xmlns:p14="http://schemas.microsoft.com/office/powerpoint/2010/main" xmlns:p15="http://schemas.microsoft.com/office/powerpoint/2012/main" Requires="p14">
       <p:transition spd="slow" p14:dur="2000"/>
     </mc:Choice>
     <mc:Fallback>
@@ -33711,7 +33711,7 @@
     <a:masterClrMapping/>
   </p:clrMapOvr>
   <mc:AlternateContent xmlns:mc="http://schemas.openxmlformats.org/markup-compatibility/2006">
-    <mc:Choice xmlns:p15="http://schemas.microsoft.com/office/powerpoint/2012/main" xmlns:p14="http://schemas.microsoft.com/office/powerpoint/2010/main" xmlns="" Requires="p14">
+    <mc:Choice xmlns="" xmlns:p14="http://schemas.microsoft.com/office/powerpoint/2010/main" xmlns:p15="http://schemas.microsoft.com/office/powerpoint/2012/main" Requires="p14">
       <p:transition spd="slow" p14:dur="2000"/>
     </mc:Choice>
     <mc:Fallback>
@@ -34040,7 +34040,7 @@
     <a:masterClrMapping/>
   </p:clrMapOvr>
   <mc:AlternateContent xmlns:mc="http://schemas.openxmlformats.org/markup-compatibility/2006">
-    <mc:Choice xmlns:p15="http://schemas.microsoft.com/office/powerpoint/2012/main" xmlns:p14="http://schemas.microsoft.com/office/powerpoint/2010/main" xmlns="" Requires="p14">
+    <mc:Choice xmlns="" xmlns:p14="http://schemas.microsoft.com/office/powerpoint/2010/main" xmlns:p15="http://schemas.microsoft.com/office/powerpoint/2012/main" Requires="p14">
       <p:transition spd="slow" p14:dur="2000"/>
     </mc:Choice>
     <mc:Fallback>
@@ -34429,7 +34429,7 @@
     <a:masterClrMapping/>
   </p:clrMapOvr>
   <mc:AlternateContent xmlns:mc="http://schemas.openxmlformats.org/markup-compatibility/2006">
-    <mc:Choice xmlns:p15="http://schemas.microsoft.com/office/powerpoint/2012/main" xmlns:p14="http://schemas.microsoft.com/office/powerpoint/2010/main" xmlns="" Requires="p14">
+    <mc:Choice xmlns="" xmlns:p14="http://schemas.microsoft.com/office/powerpoint/2010/main" xmlns:p15="http://schemas.microsoft.com/office/powerpoint/2012/main" Requires="p14">
       <p:transition spd="slow" p14:dur="2000"/>
     </mc:Choice>
     <mc:Fallback>
@@ -34795,7 +34795,7 @@
     <a:masterClrMapping/>
   </p:clrMapOvr>
   <mc:AlternateContent xmlns:mc="http://schemas.openxmlformats.org/markup-compatibility/2006">
-    <mc:Choice xmlns:p15="http://schemas.microsoft.com/office/powerpoint/2012/main" xmlns:p14="http://schemas.microsoft.com/office/powerpoint/2010/main" xmlns="" Requires="p14">
+    <mc:Choice xmlns="" xmlns:p14="http://schemas.microsoft.com/office/powerpoint/2010/main" xmlns:p15="http://schemas.microsoft.com/office/powerpoint/2012/main" Requires="p14">
       <p:transition spd="slow" p14:dur="2000"/>
     </mc:Choice>
     <mc:Fallback>
@@ -35270,7 +35270,7 @@
     <a:masterClrMapping/>
   </p:clrMapOvr>
   <mc:AlternateContent xmlns:mc="http://schemas.openxmlformats.org/markup-compatibility/2006">
-    <mc:Choice xmlns:p15="http://schemas.microsoft.com/office/powerpoint/2012/main" xmlns:p14="http://schemas.microsoft.com/office/powerpoint/2010/main" xmlns="" Requires="p14">
+    <mc:Choice xmlns="" xmlns:p14="http://schemas.microsoft.com/office/powerpoint/2010/main" xmlns:p15="http://schemas.microsoft.com/office/powerpoint/2012/main" Requires="p14">
       <p:transition spd="slow" p14:dur="2000"/>
     </mc:Choice>
     <mc:Fallback>
@@ -35921,7 +35921,7 @@
     <a:masterClrMapping/>
   </p:clrMapOvr>
   <mc:AlternateContent xmlns:mc="http://schemas.openxmlformats.org/markup-compatibility/2006">
-    <mc:Choice xmlns:p15="http://schemas.microsoft.com/office/powerpoint/2012/main" xmlns:p14="http://schemas.microsoft.com/office/powerpoint/2010/main" xmlns="" Requires="p14">
+    <mc:Choice xmlns="" xmlns:p14="http://schemas.microsoft.com/office/powerpoint/2010/main" xmlns:p15="http://schemas.microsoft.com/office/powerpoint/2012/main" Requires="p14">
       <p:transition spd="slow" p14:dur="2000"/>
     </mc:Choice>
     <mc:Fallback>
@@ -36215,28 +36215,19 @@
                 </a:solidFill>
                 <a:latin typeface="Calibri"/>
               </a:rPr>
-              <a:t>First lab will be on </a:t>
+              <a:t>First lab will be on January </a:t>
             </a:r>
             <a:r>
-              <a:rPr lang="en-CA" sz="2800" b="0" strike="noStrike" spc="-1">
+              <a:rPr lang="en-CA" sz="2800" b="0" strike="noStrike" spc="-1" dirty="0" smtClean="0">
                 <a:solidFill>
                   <a:schemeClr val="dk1"/>
                 </a:solidFill>
                 <a:latin typeface="Calibri"/>
               </a:rPr>
-              <a:t>January </a:t>
+              <a:t>12</a:t>
             </a:r>
             <a:r>
-              <a:rPr lang="en-CA" sz="2800" b="0" strike="noStrike" spc="-1" smtClean="0">
-                <a:solidFill>
-                  <a:schemeClr val="dk1"/>
-                </a:solidFill>
-                <a:latin typeface="Calibri"/>
-              </a:rPr>
-              <a:t>14</a:t>
-            </a:r>
-            <a:r>
-              <a:rPr lang="en-CA" sz="2800" b="0" strike="noStrike" spc="-1" baseline="30000" smtClean="0">
+              <a:rPr lang="en-CA" sz="2800" b="0" strike="noStrike" spc="-1" baseline="30000" dirty="0" smtClean="0">
                 <a:solidFill>
                   <a:schemeClr val="dk1"/>
                 </a:solidFill>
@@ -36280,7 +36271,7 @@
     <a:masterClrMapping/>
   </p:clrMapOvr>
   <mc:AlternateContent xmlns:mc="http://schemas.openxmlformats.org/markup-compatibility/2006">
-    <mc:Choice xmlns:p15="http://schemas.microsoft.com/office/powerpoint/2012/main" xmlns:p14="http://schemas.microsoft.com/office/powerpoint/2010/main" xmlns="" Requires="p14">
+    <mc:Choice xmlns="" xmlns:p14="http://schemas.microsoft.com/office/powerpoint/2010/main" xmlns:p15="http://schemas.microsoft.com/office/powerpoint/2012/main" Requires="p14">
       <p:transition spd="slow" p14:dur="2000"/>
     </mc:Choice>
     <mc:Fallback>
@@ -36664,7 +36655,7 @@
     <a:masterClrMapping/>
   </p:clrMapOvr>
   <mc:AlternateContent xmlns:mc="http://schemas.openxmlformats.org/markup-compatibility/2006">
-    <mc:Choice xmlns:p15="http://schemas.microsoft.com/office/powerpoint/2012/main" xmlns:p14="http://schemas.microsoft.com/office/powerpoint/2010/main" xmlns="" Requires="p14">
+    <mc:Choice xmlns="" xmlns:p14="http://schemas.microsoft.com/office/powerpoint/2010/main" xmlns:p15="http://schemas.microsoft.com/office/powerpoint/2012/main" Requires="p14">
       <p:transition spd="slow" p14:dur="2000"/>
     </mc:Choice>
     <mc:Fallback>
@@ -36945,7 +36936,7 @@
     <a:masterClrMapping/>
   </p:clrMapOvr>
   <mc:AlternateContent xmlns:mc="http://schemas.openxmlformats.org/markup-compatibility/2006">
-    <mc:Choice xmlns:p15="http://schemas.microsoft.com/office/powerpoint/2012/main" xmlns:p14="http://schemas.microsoft.com/office/powerpoint/2010/main" xmlns="" Requires="p14">
+    <mc:Choice xmlns="" xmlns:p14="http://schemas.microsoft.com/office/powerpoint/2010/main" xmlns:p15="http://schemas.microsoft.com/office/powerpoint/2012/main" Requires="p14">
       <p:transition spd="slow" p14:dur="2000"/>
     </mc:Choice>
     <mc:Fallback>
@@ -37527,7 +37518,7 @@
     <a:masterClrMapping/>
   </p:clrMapOvr>
   <mc:AlternateContent xmlns:mc="http://schemas.openxmlformats.org/markup-compatibility/2006">
-    <mc:Choice xmlns:p15="http://schemas.microsoft.com/office/powerpoint/2012/main" xmlns:p14="http://schemas.microsoft.com/office/powerpoint/2010/main" xmlns="" Requires="p14">
+    <mc:Choice xmlns="" xmlns:p14="http://schemas.microsoft.com/office/powerpoint/2010/main" xmlns:p15="http://schemas.microsoft.com/office/powerpoint/2012/main" Requires="p14">
       <p:transition spd="slow" p14:dur="2000"/>
     </mc:Choice>
     <mc:Fallback>
@@ -37976,7 +37967,7 @@
     <a:masterClrMapping/>
   </p:clrMapOvr>
   <mc:AlternateContent xmlns:mc="http://schemas.openxmlformats.org/markup-compatibility/2006">
-    <mc:Choice xmlns:p15="http://schemas.microsoft.com/office/powerpoint/2012/main" xmlns:p14="http://schemas.microsoft.com/office/powerpoint/2010/main" xmlns="" Requires="p14">
+    <mc:Choice xmlns="" xmlns:p14="http://schemas.microsoft.com/office/powerpoint/2010/main" xmlns:p15="http://schemas.microsoft.com/office/powerpoint/2012/main" Requires="p14">
       <p:transition spd="slow" p14:dur="2000"/>
     </mc:Choice>
     <mc:Fallback>
@@ -38623,7 +38614,7 @@
     <a:masterClrMapping/>
   </p:clrMapOvr>
   <mc:AlternateContent xmlns:mc="http://schemas.openxmlformats.org/markup-compatibility/2006">
-    <mc:Choice xmlns:p15="http://schemas.microsoft.com/office/powerpoint/2012/main" xmlns:p14="http://schemas.microsoft.com/office/powerpoint/2010/main" xmlns="" Requires="p14">
+    <mc:Choice xmlns="" xmlns:p14="http://schemas.microsoft.com/office/powerpoint/2010/main" xmlns:p15="http://schemas.microsoft.com/office/powerpoint/2012/main" Requires="p14">
       <p:transition spd="slow" p14:dur="2000"/>
     </mc:Choice>
     <mc:Fallback>
@@ -39013,7 +39004,7 @@
     <a:masterClrMapping/>
   </p:clrMapOvr>
   <mc:AlternateContent xmlns:mc="http://schemas.openxmlformats.org/markup-compatibility/2006">
-    <mc:Choice xmlns:p15="http://schemas.microsoft.com/office/powerpoint/2012/main" xmlns:p14="http://schemas.microsoft.com/office/powerpoint/2010/main" xmlns="" Requires="p14">
+    <mc:Choice xmlns="" xmlns:p14="http://schemas.microsoft.com/office/powerpoint/2010/main" xmlns:p15="http://schemas.microsoft.com/office/powerpoint/2012/main" Requires="p14">
       <p:transition spd="slow" p14:dur="2000"/>
     </mc:Choice>
     <mc:Fallback>
@@ -39347,7 +39338,7 @@
     <a:masterClrMapping/>
   </p:clrMapOvr>
   <mc:AlternateContent xmlns:mc="http://schemas.openxmlformats.org/markup-compatibility/2006">
-    <mc:Choice xmlns:p15="http://schemas.microsoft.com/office/powerpoint/2012/main" xmlns:p14="http://schemas.microsoft.com/office/powerpoint/2010/main" xmlns="" Requires="p14">
+    <mc:Choice xmlns="" xmlns:p14="http://schemas.microsoft.com/office/powerpoint/2010/main" xmlns:p15="http://schemas.microsoft.com/office/powerpoint/2012/main" Requires="p14">
       <p:transition spd="slow" p14:dur="2000"/>
     </mc:Choice>
     <mc:Fallback>
@@ -39698,7 +39689,7 @@
     <a:masterClrMapping/>
   </p:clrMapOvr>
   <mc:AlternateContent xmlns:mc="http://schemas.openxmlformats.org/markup-compatibility/2006">
-    <mc:Choice xmlns:p15="http://schemas.microsoft.com/office/powerpoint/2012/main" xmlns:p14="http://schemas.microsoft.com/office/powerpoint/2010/main" xmlns="" Requires="p14">
+    <mc:Choice xmlns="" xmlns:p14="http://schemas.microsoft.com/office/powerpoint/2010/main" xmlns:p15="http://schemas.microsoft.com/office/powerpoint/2012/main" Requires="p14">
       <p:transition spd="slow" p14:dur="2000"/>
     </mc:Choice>
     <mc:Fallback>

</xml_diff>